<commit_message>
last version of ppt presentation
</commit_message>
<xml_diff>
--- a/Prezentacija.pptx
+++ b/Prezentacija.pptx
@@ -352,7 +352,7 @@
             <a:fld id="{1D8BD707-D9CF-40AE-B4C6-C98DA3205C09}" type="datetimeFigureOut">
               <a:rPr lang="en-US" smtClean="0"/>
               <a:pPr/>
-              <a:t>1/22/2024</a:t>
+              <a:t>1/23/2024</a:t>
             </a:fld>
             <a:endParaRPr lang="en-US"/>
           </a:p>
@@ -517,7 +517,7 @@
             <a:fld id="{1D8BD707-D9CF-40AE-B4C6-C98DA3205C09}" type="datetimeFigureOut">
               <a:rPr lang="en-US" smtClean="0"/>
               <a:pPr/>
-              <a:t>1/22/2024</a:t>
+              <a:t>1/23/2024</a:t>
             </a:fld>
             <a:endParaRPr lang="en-US"/>
           </a:p>
@@ -692,7 +692,7 @@
             <a:fld id="{1D8BD707-D9CF-40AE-B4C6-C98DA3205C09}" type="datetimeFigureOut">
               <a:rPr lang="en-US" smtClean="0"/>
               <a:pPr/>
-              <a:t>1/22/2024</a:t>
+              <a:t>1/23/2024</a:t>
             </a:fld>
             <a:endParaRPr lang="en-US"/>
           </a:p>
@@ -857,7 +857,7 @@
             <a:fld id="{1D8BD707-D9CF-40AE-B4C6-C98DA3205C09}" type="datetimeFigureOut">
               <a:rPr lang="en-US" smtClean="0"/>
               <a:pPr/>
-              <a:t>1/22/2024</a:t>
+              <a:t>1/23/2024</a:t>
             </a:fld>
             <a:endParaRPr lang="en-US"/>
           </a:p>
@@ -1099,7 +1099,7 @@
             <a:fld id="{1D8BD707-D9CF-40AE-B4C6-C98DA3205C09}" type="datetimeFigureOut">
               <a:rPr lang="en-US" smtClean="0"/>
               <a:pPr/>
-              <a:t>1/22/2024</a:t>
+              <a:t>1/23/2024</a:t>
             </a:fld>
             <a:endParaRPr lang="en-US"/>
           </a:p>
@@ -1381,7 +1381,7 @@
             <a:fld id="{1D8BD707-D9CF-40AE-B4C6-C98DA3205C09}" type="datetimeFigureOut">
               <a:rPr lang="en-US" smtClean="0"/>
               <a:pPr/>
-              <a:t>1/22/2024</a:t>
+              <a:t>1/23/2024</a:t>
             </a:fld>
             <a:endParaRPr lang="en-US"/>
           </a:p>
@@ -1797,7 +1797,7 @@
             <a:fld id="{1D8BD707-D9CF-40AE-B4C6-C98DA3205C09}" type="datetimeFigureOut">
               <a:rPr lang="en-US" smtClean="0"/>
               <a:pPr/>
-              <a:t>1/22/2024</a:t>
+              <a:t>1/23/2024</a:t>
             </a:fld>
             <a:endParaRPr lang="en-US"/>
           </a:p>
@@ -1911,7 +1911,7 @@
             <a:fld id="{1D8BD707-D9CF-40AE-B4C6-C98DA3205C09}" type="datetimeFigureOut">
               <a:rPr lang="en-US" smtClean="0"/>
               <a:pPr/>
-              <a:t>1/22/2024</a:t>
+              <a:t>1/23/2024</a:t>
             </a:fld>
             <a:endParaRPr lang="en-US"/>
           </a:p>
@@ -2003,7 +2003,7 @@
             <a:fld id="{1D8BD707-D9CF-40AE-B4C6-C98DA3205C09}" type="datetimeFigureOut">
               <a:rPr lang="en-US" smtClean="0"/>
               <a:pPr/>
-              <a:t>1/22/2024</a:t>
+              <a:t>1/23/2024</a:t>
             </a:fld>
             <a:endParaRPr lang="en-US"/>
           </a:p>
@@ -2275,7 +2275,7 @@
             <a:fld id="{1D8BD707-D9CF-40AE-B4C6-C98DA3205C09}" type="datetimeFigureOut">
               <a:rPr lang="en-US" smtClean="0"/>
               <a:pPr/>
-              <a:t>1/22/2024</a:t>
+              <a:t>1/23/2024</a:t>
             </a:fld>
             <a:endParaRPr lang="en-US"/>
           </a:p>
@@ -2524,7 +2524,7 @@
             <a:fld id="{1D8BD707-D9CF-40AE-B4C6-C98DA3205C09}" type="datetimeFigureOut">
               <a:rPr lang="en-US" smtClean="0"/>
               <a:pPr/>
-              <a:t>1/22/2024</a:t>
+              <a:t>1/23/2024</a:t>
             </a:fld>
             <a:endParaRPr lang="en-US"/>
           </a:p>
@@ -2732,7 +2732,7 @@
             <a:fld id="{1D8BD707-D9CF-40AE-B4C6-C98DA3205C09}" type="datetimeFigureOut">
               <a:rPr lang="en-US" smtClean="0"/>
               <a:pPr/>
-              <a:t>1/22/2024</a:t>
+              <a:t>1/23/2024</a:t>
             </a:fld>
             <a:endParaRPr lang="en-US"/>
           </a:p>
@@ -3621,7 +3621,7 @@
         <p:spPr>
           <a:xfrm>
             <a:off x="5410200" y="8852684"/>
-            <a:ext cx="3315903" cy="436017"/>
+            <a:ext cx="3315903" cy="450893"/>
           </a:xfrm>
           <a:prstGeom prst="rect">
             <a:avLst/>
@@ -3639,7 +3639,7 @@
               </a:lnSpc>
             </a:pPr>
             <a:r>
-              <a:rPr lang="en-US" sz="3800" dirty="0" err="1">
+              <a:rPr lang="en-US" sz="4200" dirty="0" err="1">
                 <a:solidFill>
                   <a:schemeClr val="tx2"/>
                 </a:solidFill>
@@ -3647,7 +3647,7 @@
               </a:rPr>
               <a:t>grupa</a:t>
             </a:r>
-            <a:endParaRPr lang="en-US" sz="3800" dirty="0">
+            <a:endParaRPr lang="en-US" sz="4200" dirty="0">
               <a:solidFill>
                 <a:schemeClr val="tx2"/>
               </a:solidFill>
@@ -3665,7 +3665,7 @@
         <p:spPr>
           <a:xfrm>
             <a:off x="8812919" y="8852684"/>
-            <a:ext cx="3852889" cy="436017"/>
+            <a:ext cx="3852889" cy="450893"/>
           </a:xfrm>
           <a:prstGeom prst="rect">
             <a:avLst/>
@@ -3683,7 +3683,7 @@
               </a:lnSpc>
             </a:pPr>
             <a:r>
-              <a:rPr lang="en-US" sz="3800" dirty="0" err="1">
+              <a:rPr lang="en-US" sz="4200" dirty="0" err="1">
                 <a:solidFill>
                   <a:schemeClr val="tx2"/>
                 </a:solidFill>
@@ -3691,7 +3691,7 @@
               </a:rPr>
               <a:t>Tintilinići</a:t>
             </a:r>
-            <a:endParaRPr lang="en-US" sz="3800" dirty="0">
+            <a:endParaRPr lang="en-US" sz="4200" dirty="0">
               <a:solidFill>
                 <a:schemeClr val="tx2"/>
               </a:solidFill>
@@ -3760,14 +3760,38 @@
               </a:lnSpc>
             </a:pPr>
             <a:r>
-              <a:rPr lang="en-US" sz="7650">
+              <a:rPr lang="en-US" sz="7650" dirty="0" err="1">
                 <a:solidFill>
                   <a:srgbClr val="FF914D"/>
                 </a:solidFill>
                 <a:latin typeface="Alata"/>
               </a:rPr>
-              <a:t>Arhitektura sustava</a:t>
-            </a:r>
+              <a:t>Arhitektura</a:t>
+            </a:r>
+            <a:r>
+              <a:rPr lang="en-US" sz="7650" dirty="0">
+                <a:solidFill>
+                  <a:srgbClr val="FF914D"/>
+                </a:solidFill>
+                <a:latin typeface="Alata"/>
+              </a:rPr>
+              <a:t> </a:t>
+            </a:r>
+            <a:r>
+              <a:rPr lang="en-US" sz="7650" dirty="0" err="1">
+                <a:solidFill>
+                  <a:srgbClr val="FF914D"/>
+                </a:solidFill>
+                <a:latin typeface="Alata"/>
+              </a:rPr>
+              <a:t>sustava</a:t>
+            </a:r>
+            <a:endParaRPr lang="en-US" sz="7650" dirty="0">
+              <a:solidFill>
+                <a:srgbClr val="FF914D"/>
+              </a:solidFill>
+              <a:latin typeface="Alata"/>
+            </a:endParaRPr>
           </a:p>
         </p:txBody>
       </p:sp>
@@ -3935,7 +3959,7 @@
         <p:spPr>
           <a:xfrm>
             <a:off x="11609337" y="1973908"/>
-            <a:ext cx="6678663" cy="4852707"/>
+            <a:ext cx="6678663" cy="6287619"/>
           </a:xfrm>
           <a:prstGeom prst="rect">
             <a:avLst/>
@@ -3955,14 +3979,38 @@
               <a:buChar char="•"/>
             </a:pPr>
             <a:r>
-              <a:rPr lang="en-US" sz="3506">
+              <a:rPr lang="en-US" sz="3506" dirty="0" err="1">
                 <a:solidFill>
                   <a:srgbClr val="FF914D"/>
                 </a:solidFill>
                 <a:latin typeface="Open Sans 2"/>
               </a:rPr>
-              <a:t>osnovni razred</a:t>
-            </a:r>
+              <a:t>osnovni</a:t>
+            </a:r>
+            <a:r>
+              <a:rPr lang="en-US" sz="3506" dirty="0">
+                <a:solidFill>
+                  <a:srgbClr val="FF914D"/>
+                </a:solidFill>
+                <a:latin typeface="Open Sans 2"/>
+              </a:rPr>
+              <a:t> </a:t>
+            </a:r>
+            <a:r>
+              <a:rPr lang="en-US" sz="3506" dirty="0" err="1">
+                <a:solidFill>
+                  <a:srgbClr val="FF914D"/>
+                </a:solidFill>
+                <a:latin typeface="Open Sans 2"/>
+              </a:rPr>
+              <a:t>razred</a:t>
+            </a:r>
+            <a:endParaRPr lang="en-US" sz="3506" dirty="0">
+              <a:solidFill>
+                <a:srgbClr val="FF914D"/>
+              </a:solidFill>
+              <a:latin typeface="Open Sans 2"/>
+            </a:endParaRPr>
           </a:p>
           <a:p>
             <a:pPr marL="756977" lvl="1" indent="-378489">
@@ -3973,13 +4021,172 @@
               <a:buChar char="•"/>
             </a:pPr>
             <a:r>
-              <a:rPr lang="en-US" sz="3506">
+              <a:rPr lang="en-US" sz="3506" dirty="0" err="1">
                 <a:solidFill>
                   <a:srgbClr val="FF914D"/>
                 </a:solidFill>
                 <a:latin typeface="Open Sans 2"/>
               </a:rPr>
-              <a:t>glavni entiteti: Patient, TransportVehicle, Accomodation, AccomodationOrder </a:t>
+              <a:t>glavni</a:t>
+            </a:r>
+            <a:r>
+              <a:rPr lang="en-US" sz="3506" dirty="0">
+                <a:solidFill>
+                  <a:srgbClr val="FF914D"/>
+                </a:solidFill>
+                <a:latin typeface="Open Sans 2"/>
+              </a:rPr>
+              <a:t> </a:t>
+            </a:r>
+            <a:r>
+              <a:rPr lang="en-US" sz="3506" dirty="0" err="1">
+                <a:solidFill>
+                  <a:srgbClr val="FF914D"/>
+                </a:solidFill>
+                <a:latin typeface="Open Sans 2"/>
+              </a:rPr>
+              <a:t>entiteti</a:t>
+            </a:r>
+            <a:r>
+              <a:rPr lang="en-US" sz="3506" dirty="0">
+                <a:solidFill>
+                  <a:srgbClr val="FF914D"/>
+                </a:solidFill>
+                <a:latin typeface="Open Sans 2"/>
+              </a:rPr>
+              <a:t>: </a:t>
+            </a:r>
+            <a:endParaRPr lang="hr-HR" sz="3506" dirty="0">
+              <a:solidFill>
+                <a:srgbClr val="FF914D"/>
+              </a:solidFill>
+              <a:latin typeface="Open Sans 2"/>
+            </a:endParaRPr>
+          </a:p>
+          <a:p>
+            <a:pPr marL="1214177" lvl="2" indent="-378489">
+              <a:lnSpc>
+                <a:spcPts val="5539"/>
+              </a:lnSpc>
+              <a:buFont typeface="Arial"/>
+              <a:buChar char="•"/>
+            </a:pPr>
+            <a:r>
+              <a:rPr lang="en-US" sz="3506" dirty="0">
+                <a:solidFill>
+                  <a:srgbClr val="FF914D"/>
+                </a:solidFill>
+                <a:latin typeface="Open Sans 2"/>
+              </a:rPr>
+              <a:t>Patient</a:t>
+            </a:r>
+            <a:endParaRPr lang="hr-HR" sz="3506" dirty="0">
+              <a:solidFill>
+                <a:srgbClr val="FF914D"/>
+              </a:solidFill>
+              <a:latin typeface="Open Sans 2"/>
+            </a:endParaRPr>
+          </a:p>
+          <a:p>
+            <a:pPr marL="1214177" lvl="2" indent="-378489">
+              <a:lnSpc>
+                <a:spcPts val="5539"/>
+              </a:lnSpc>
+              <a:buFont typeface="Arial"/>
+              <a:buChar char="•"/>
+            </a:pPr>
+            <a:r>
+              <a:rPr lang="en-US" sz="3506" dirty="0">
+                <a:solidFill>
+                  <a:srgbClr val="FF914D"/>
+                </a:solidFill>
+                <a:latin typeface="Open Sans 2"/>
+              </a:rPr>
+              <a:t> </a:t>
+            </a:r>
+            <a:r>
+              <a:rPr lang="en-US" sz="3506" dirty="0" err="1">
+                <a:solidFill>
+                  <a:srgbClr val="FF914D"/>
+                </a:solidFill>
+                <a:latin typeface="Open Sans 2"/>
+              </a:rPr>
+              <a:t>TransportVehicle</a:t>
+            </a:r>
+            <a:endParaRPr lang="hr-HR" sz="3506" dirty="0">
+              <a:solidFill>
+                <a:srgbClr val="FF914D"/>
+              </a:solidFill>
+              <a:latin typeface="Open Sans 2"/>
+            </a:endParaRPr>
+          </a:p>
+          <a:p>
+            <a:pPr marL="1214177" lvl="2" indent="-378489">
+              <a:lnSpc>
+                <a:spcPts val="5539"/>
+              </a:lnSpc>
+              <a:buFont typeface="Arial"/>
+              <a:buChar char="•"/>
+            </a:pPr>
+            <a:r>
+              <a:rPr lang="en-US" sz="3506" dirty="0">
+                <a:solidFill>
+                  <a:srgbClr val="FF914D"/>
+                </a:solidFill>
+                <a:latin typeface="Open Sans 2"/>
+              </a:rPr>
+              <a:t> </a:t>
+            </a:r>
+            <a:r>
+              <a:rPr lang="en-US" sz="3506" dirty="0" err="1">
+                <a:solidFill>
+                  <a:srgbClr val="FF914D"/>
+                </a:solidFill>
+                <a:latin typeface="Open Sans 2"/>
+              </a:rPr>
+              <a:t>Accomodation</a:t>
+            </a:r>
+            <a:endParaRPr lang="hr-HR" sz="3506" dirty="0">
+              <a:solidFill>
+                <a:srgbClr val="FF914D"/>
+              </a:solidFill>
+              <a:latin typeface="Open Sans 2"/>
+            </a:endParaRPr>
+          </a:p>
+          <a:p>
+            <a:pPr marL="1214177" lvl="2" indent="-378489">
+              <a:lnSpc>
+                <a:spcPts val="5539"/>
+              </a:lnSpc>
+              <a:buFont typeface="Arial"/>
+              <a:buChar char="•"/>
+            </a:pPr>
+            <a:r>
+              <a:rPr lang="en-US" sz="3506" dirty="0">
+                <a:solidFill>
+                  <a:srgbClr val="FF914D"/>
+                </a:solidFill>
+                <a:latin typeface="Open Sans 2"/>
+              </a:rPr>
+              <a:t> </a:t>
+            </a:r>
+            <a:r>
+              <a:rPr lang="en-US" sz="3506" dirty="0" err="1">
+                <a:solidFill>
+                  <a:srgbClr val="FF914D"/>
+                </a:solidFill>
+                <a:latin typeface="Open Sans 2"/>
+              </a:rPr>
+              <a:t>AccomodationOrder</a:t>
+            </a:r>
+            <a:r>
+              <a:rPr lang="en-US" sz="3506" dirty="0">
+                <a:solidFill>
+                  <a:srgbClr val="FF914D"/>
+                </a:solidFill>
+                <a:latin typeface="Open Sans 2"/>
+              </a:rPr>
+              <a:t> </a:t>
             </a:r>
           </a:p>
           <a:p>
@@ -3991,14 +4198,113 @@
               <a:buChar char="•"/>
             </a:pPr>
             <a:r>
-              <a:rPr lang="en-US" sz="3506">
+              <a:rPr lang="en-US" sz="3506" dirty="0" err="1">
                 <a:solidFill>
                   <a:srgbClr val="FF914D"/>
                 </a:solidFill>
                 <a:latin typeface="Open Sans 2"/>
               </a:rPr>
-              <a:t>sigurnosni aspekt: SecurityUser i SecurityRole</a:t>
-            </a:r>
+              <a:t>sigurnosni</a:t>
+            </a:r>
+            <a:r>
+              <a:rPr lang="en-US" sz="3506" dirty="0">
+                <a:solidFill>
+                  <a:srgbClr val="FF914D"/>
+                </a:solidFill>
+                <a:latin typeface="Open Sans 2"/>
+              </a:rPr>
+              <a:t> </a:t>
+            </a:r>
+            <a:r>
+              <a:rPr lang="en-US" sz="3506" dirty="0" err="1">
+                <a:solidFill>
+                  <a:srgbClr val="FF914D"/>
+                </a:solidFill>
+                <a:latin typeface="Open Sans 2"/>
+              </a:rPr>
+              <a:t>aspekt</a:t>
+            </a:r>
+            <a:r>
+              <a:rPr lang="en-US" sz="3506" dirty="0">
+                <a:solidFill>
+                  <a:srgbClr val="FF914D"/>
+                </a:solidFill>
+                <a:latin typeface="Open Sans 2"/>
+              </a:rPr>
+              <a:t>:</a:t>
+            </a:r>
+            <a:endParaRPr lang="hr-HR" sz="3506" dirty="0">
+              <a:solidFill>
+                <a:srgbClr val="FF914D"/>
+              </a:solidFill>
+              <a:latin typeface="Open Sans 2"/>
+            </a:endParaRPr>
+          </a:p>
+          <a:p>
+            <a:pPr marL="1214177" lvl="2" indent="-378489">
+              <a:lnSpc>
+                <a:spcPts val="5539"/>
+              </a:lnSpc>
+              <a:buFont typeface="Arial"/>
+              <a:buChar char="•"/>
+            </a:pPr>
+            <a:r>
+              <a:rPr lang="en-US" sz="3506" dirty="0">
+                <a:solidFill>
+                  <a:srgbClr val="FF914D"/>
+                </a:solidFill>
+                <a:latin typeface="Open Sans 2"/>
+              </a:rPr>
+              <a:t> </a:t>
+            </a:r>
+            <a:r>
+              <a:rPr lang="en-US" sz="3506" dirty="0" err="1">
+                <a:solidFill>
+                  <a:srgbClr val="FF914D"/>
+                </a:solidFill>
+                <a:latin typeface="Open Sans 2"/>
+              </a:rPr>
+              <a:t>SecurityUser</a:t>
+            </a:r>
+            <a:endParaRPr lang="hr-HR" sz="3506" dirty="0">
+              <a:solidFill>
+                <a:srgbClr val="FF914D"/>
+              </a:solidFill>
+              <a:latin typeface="Open Sans 2"/>
+            </a:endParaRPr>
+          </a:p>
+          <a:p>
+            <a:pPr marL="1214177" lvl="2" indent="-378489">
+              <a:lnSpc>
+                <a:spcPts val="5539"/>
+              </a:lnSpc>
+              <a:buFont typeface="Arial"/>
+              <a:buChar char="•"/>
+            </a:pPr>
+            <a:r>
+              <a:rPr lang="en-US" sz="3506" dirty="0">
+                <a:solidFill>
+                  <a:srgbClr val="FF914D"/>
+                </a:solidFill>
+                <a:latin typeface="Open Sans 2"/>
+              </a:rPr>
+              <a:t> </a:t>
+            </a:r>
+            <a:r>
+              <a:rPr lang="en-US" sz="3506" dirty="0" err="1">
+                <a:solidFill>
+                  <a:srgbClr val="FF914D"/>
+                </a:solidFill>
+                <a:latin typeface="Open Sans 2"/>
+              </a:rPr>
+              <a:t>SecurityRole</a:t>
+            </a:r>
+            <a:endParaRPr lang="en-US" sz="3506" dirty="0">
+              <a:solidFill>
+                <a:srgbClr val="FF914D"/>
+              </a:solidFill>
+              <a:latin typeface="Open Sans 2"/>
+            </a:endParaRPr>
           </a:p>
         </p:txBody>
       </p:sp>
@@ -4135,7 +4441,7 @@
         <p:spPr>
           <a:xfrm>
             <a:off x="11609337" y="1973908"/>
-            <a:ext cx="6678663" cy="5552433"/>
+            <a:ext cx="6678663" cy="3466334"/>
           </a:xfrm>
           <a:prstGeom prst="rect">
             <a:avLst/>
@@ -4155,13 +4461,49 @@
               <a:buChar char="•"/>
             </a:pPr>
             <a:r>
-              <a:rPr lang="en-US" sz="3506">
+              <a:rPr lang="en-US" sz="3506" dirty="0">
                 <a:solidFill>
                   <a:srgbClr val="FF914D"/>
                 </a:solidFill>
                 <a:latin typeface="Open Sans 2"/>
               </a:rPr>
-              <a:t>3 komponente: frontend, backend i Medical Service</a:t>
+              <a:t>3 </a:t>
+            </a:r>
+            <a:r>
+              <a:rPr lang="en-US" sz="3506" dirty="0" err="1">
+                <a:solidFill>
+                  <a:srgbClr val="FF914D"/>
+                </a:solidFill>
+                <a:latin typeface="Open Sans 2"/>
+              </a:rPr>
+              <a:t>komponente</a:t>
+            </a:r>
+            <a:r>
+              <a:rPr lang="en-US" sz="3506" dirty="0">
+                <a:solidFill>
+                  <a:srgbClr val="FF914D"/>
+                </a:solidFill>
+                <a:latin typeface="Open Sans 2"/>
+              </a:rPr>
+              <a:t>: frontend, backend </a:t>
+            </a:r>
+            <a:r>
+              <a:rPr lang="en-US" sz="3506" dirty="0" err="1">
+                <a:solidFill>
+                  <a:srgbClr val="FF914D"/>
+                </a:solidFill>
+                <a:latin typeface="Open Sans 2"/>
+              </a:rPr>
+              <a:t>i</a:t>
+            </a:r>
+            <a:r>
+              <a:rPr lang="en-US" sz="3506" dirty="0">
+                <a:solidFill>
+                  <a:srgbClr val="FF914D"/>
+                </a:solidFill>
+                <a:latin typeface="Open Sans 2"/>
+              </a:rPr>
+              <a:t> Medical Service</a:t>
             </a:r>
           </a:p>
           <a:p>
@@ -4173,13 +4515,31 @@
               <a:buChar char="•"/>
             </a:pPr>
             <a:r>
-              <a:rPr lang="en-US" sz="3506">
+              <a:rPr lang="en-US" sz="3506" dirty="0">
                 <a:solidFill>
                   <a:srgbClr val="FF914D"/>
                 </a:solidFill>
                 <a:latin typeface="Open Sans 2"/>
               </a:rPr>
-              <a:t>frontend - biblioteka React</a:t>
+              <a:t>frontend - </a:t>
+            </a:r>
+            <a:r>
+              <a:rPr lang="en-US" sz="3506" dirty="0" err="1">
+                <a:solidFill>
+                  <a:srgbClr val="FF914D"/>
+                </a:solidFill>
+                <a:latin typeface="Open Sans 2"/>
+              </a:rPr>
+              <a:t>biblioteka</a:t>
+            </a:r>
+            <a:r>
+              <a:rPr lang="en-US" sz="3506" dirty="0">
+                <a:solidFill>
+                  <a:srgbClr val="FF914D"/>
+                </a:solidFill>
+                <a:latin typeface="Open Sans 2"/>
+              </a:rPr>
+              <a:t> React</a:t>
             </a:r>
           </a:p>
           <a:p>
@@ -4191,7 +4551,7 @@
               <a:buChar char="•"/>
             </a:pPr>
             <a:r>
-              <a:rPr lang="en-US" sz="3506">
+              <a:rPr lang="en-US" sz="3506" dirty="0">
                 <a:solidFill>
                   <a:srgbClr val="FF914D"/>
                 </a:solidFill>
@@ -4209,31 +4569,13 @@
               <a:buChar char="•"/>
             </a:pPr>
             <a:r>
-              <a:rPr lang="en-US" sz="3506">
+              <a:rPr lang="en-US" sz="3506" dirty="0">
                 <a:solidFill>
                   <a:srgbClr val="FF914D"/>
                 </a:solidFill>
                 <a:latin typeface="Open Sans 2"/>
               </a:rPr>
-              <a:t>razmjena podataka preko REST_APIja</a:t>
-            </a:r>
-          </a:p>
-          <a:p>
-            <a:pPr marL="756977" lvl="1" indent="-378489" algn="l">
-              <a:lnSpc>
-                <a:spcPts val="5539"/>
-              </a:lnSpc>
-              <a:buFont typeface="Arial"/>
-              <a:buChar char="•"/>
-            </a:pPr>
-            <a:r>
-              <a:rPr lang="en-US" sz="3506">
-                <a:solidFill>
-                  <a:srgbClr val="FF914D"/>
-                </a:solidFill>
-                <a:latin typeface="Open Sans 2"/>
-              </a:rPr>
-              <a:t>baza s backendom - preko SQL upita</a:t>
+              <a:t>REST_API</a:t>
             </a:r>
           </a:p>
         </p:txBody>
@@ -4279,8 +4621,8 @@
         </p:nvGrpSpPr>
         <p:grpSpPr>
           <a:xfrm>
-            <a:off x="4216590" y="3842569"/>
-            <a:ext cx="3388048" cy="4359851"/>
+            <a:off x="3720966" y="3008831"/>
+            <a:ext cx="4648200" cy="6027328"/>
             <a:chOff x="0" y="0"/>
             <a:chExt cx="3133810" cy="4032689"/>
           </a:xfrm>
@@ -4364,8 +4706,8 @@
         </p:nvSpPr>
         <p:spPr>
           <a:xfrm>
-            <a:off x="4581798" y="4126833"/>
-            <a:ext cx="2657633" cy="450215"/>
+            <a:off x="4343400" y="3625320"/>
+            <a:ext cx="2657633" cy="478657"/>
           </a:xfrm>
           <a:prstGeom prst="rect">
             <a:avLst/>
@@ -4386,7 +4728,7 @@
               </a:spcBef>
             </a:pPr>
             <a:r>
-              <a:rPr lang="en-US" sz="2799">
+              <a:rPr lang="en-US" sz="4000" dirty="0">
                 <a:solidFill>
                   <a:srgbClr val="000000"/>
                 </a:solidFill>
@@ -4405,15 +4747,15 @@
         </p:nvSpPr>
         <p:spPr>
           <a:xfrm>
-            <a:off x="4581798" y="4881562"/>
-            <a:ext cx="2657633" cy="447675"/>
+            <a:off x="4405528" y="4881561"/>
+            <a:ext cx="3419202" cy="474489"/>
           </a:xfrm>
           <a:prstGeom prst="rect">
             <a:avLst/>
           </a:prstGeom>
         </p:spPr>
         <p:txBody>
-          <a:bodyPr lIns="0" tIns="0" rIns="0" bIns="0" rtlCol="0" anchor="t">
+          <a:bodyPr wrap="square" lIns="0" tIns="0" rIns="0" bIns="0" rtlCol="0" anchor="t">
             <a:spAutoFit/>
           </a:bodyPr>
           <a:lstStyle/>
@@ -4427,7 +4769,7 @@
               </a:spcBef>
             </a:pPr>
             <a:r>
-              <a:rPr lang="en-US" sz="2499">
+              <a:rPr lang="en-US" sz="3300" dirty="0">
                 <a:solidFill>
                   <a:srgbClr val="000000"/>
                 </a:solidFill>
@@ -4446,8 +4788,8 @@
         </p:nvSpPr>
         <p:spPr>
           <a:xfrm>
-            <a:off x="4581798" y="5634038"/>
-            <a:ext cx="2657633" cy="914400"/>
+            <a:off x="4405528" y="5702464"/>
+            <a:ext cx="2657633" cy="474489"/>
           </a:xfrm>
           <a:prstGeom prst="rect">
             <a:avLst/>
@@ -4468,13 +4810,13 @@
               </a:spcBef>
             </a:pPr>
             <a:r>
-              <a:rPr lang="en-US" sz="2499">
+              <a:rPr lang="en-US" sz="3300" dirty="0">
                 <a:solidFill>
                   <a:srgbClr val="000000"/>
                 </a:solidFill>
                 <a:latin typeface="Open Sans 1"/>
               </a:rPr>
-              <a:t>programski jezik Java</a:t>
+              <a:t>Java</a:t>
             </a:r>
           </a:p>
         </p:txBody>
@@ -4487,8 +4829,8 @@
         </p:nvGrpSpPr>
         <p:grpSpPr>
           <a:xfrm>
-            <a:off x="10859631" y="3842569"/>
-            <a:ext cx="3388048" cy="4359851"/>
+            <a:off x="10439400" y="3008831"/>
+            <a:ext cx="4648200" cy="6027329"/>
             <a:chOff x="0" y="0"/>
             <a:chExt cx="3133810" cy="4032689"/>
           </a:xfrm>
@@ -4572,8 +4914,8 @@
         </p:nvSpPr>
         <p:spPr>
           <a:xfrm>
-            <a:off x="11224839" y="4126833"/>
-            <a:ext cx="2657633" cy="450215"/>
+            <a:off x="10972800" y="3625320"/>
+            <a:ext cx="2657633" cy="478657"/>
           </a:xfrm>
           <a:prstGeom prst="rect">
             <a:avLst/>
@@ -4594,7 +4936,7 @@
               </a:spcBef>
             </a:pPr>
             <a:r>
-              <a:rPr lang="en-US" sz="2799">
+              <a:rPr lang="en-US" sz="4000" dirty="0">
                 <a:solidFill>
                   <a:srgbClr val="000000"/>
                 </a:solidFill>
@@ -4613,8 +4955,8 @@
         </p:nvSpPr>
         <p:spPr>
           <a:xfrm>
-            <a:off x="11224839" y="4881562"/>
-            <a:ext cx="2657633" cy="447675"/>
+            <a:off x="11224839" y="4766263"/>
+            <a:ext cx="2657633" cy="474489"/>
           </a:xfrm>
           <a:prstGeom prst="rect">
             <a:avLst/>
@@ -4635,7 +4977,7 @@
               </a:spcBef>
             </a:pPr>
             <a:r>
-              <a:rPr lang="en-US" sz="2499">
+              <a:rPr lang="en-US" sz="3300" dirty="0">
                 <a:solidFill>
                   <a:srgbClr val="000000"/>
                 </a:solidFill>
@@ -4696,7 +5038,7 @@
         <p:spPr>
           <a:xfrm>
             <a:off x="11224839" y="5527194"/>
-            <a:ext cx="2657633" cy="914400"/>
+            <a:ext cx="2657633" cy="474489"/>
           </a:xfrm>
           <a:prstGeom prst="rect">
             <a:avLst/>
@@ -4717,13 +5059,13 @@
               </a:spcBef>
             </a:pPr>
             <a:r>
-              <a:rPr lang="en-US" sz="2499">
+              <a:rPr lang="en-US" sz="3300" dirty="0">
                 <a:solidFill>
                   <a:srgbClr val="000000"/>
                 </a:solidFill>
                 <a:latin typeface="Open Sans 1"/>
               </a:rPr>
-              <a:t>React i ReactQuery</a:t>
+              <a:t>React</a:t>
             </a:r>
           </a:p>
         </p:txBody>
@@ -4736,8 +5078,8 @@
         </p:nvSpPr>
         <p:spPr>
           <a:xfrm>
-            <a:off x="11224839" y="6641619"/>
-            <a:ext cx="2657633" cy="914400"/>
+            <a:off x="11244203" y="7094760"/>
+            <a:ext cx="2657633" cy="474489"/>
           </a:xfrm>
           <a:prstGeom prst="rect">
             <a:avLst/>
@@ -4758,14 +5100,135 @@
               </a:spcBef>
             </a:pPr>
             <a:r>
-              <a:rPr lang="en-US" sz="2499">
+              <a:rPr lang="hr-HR" sz="3300" dirty="0" err="1">
                 <a:solidFill>
                   <a:srgbClr val="000000"/>
                 </a:solidFill>
                 <a:latin typeface="Open Sans 1"/>
               </a:rPr>
-              <a:t>ChakraUI i TailwindCSS</a:t>
-            </a:r>
+              <a:t>ChakraUI</a:t>
+            </a:r>
+            <a:endParaRPr lang="en-US" sz="3300" dirty="0">
+              <a:solidFill>
+                <a:srgbClr val="000000"/>
+              </a:solidFill>
+              <a:latin typeface="Open Sans 1"/>
+            </a:endParaRPr>
+          </a:p>
+        </p:txBody>
+      </p:sp>
+      <p:sp>
+        <p:nvSpPr>
+          <p:cNvPr id="14" name="TextBox 12">
+            <a:extLst>
+              <a:ext uri="{FF2B5EF4-FFF2-40B4-BE49-F238E27FC236}">
+                <a16:creationId xmlns:a16="http://schemas.microsoft.com/office/drawing/2014/main" id="{2282BB3D-4011-E58B-25FD-F0CDAA8EA626}"/>
+              </a:ext>
+            </a:extLst>
+          </p:cNvPr>
+          <p:cNvSpPr txBox="1"/>
+          <p:nvPr/>
+        </p:nvSpPr>
+        <p:spPr>
+          <a:xfrm>
+            <a:off x="11246075" y="6333829"/>
+            <a:ext cx="2657633" cy="474489"/>
+          </a:xfrm>
+          <a:prstGeom prst="rect">
+            <a:avLst/>
+          </a:prstGeom>
+        </p:spPr>
+        <p:txBody>
+          <a:bodyPr lIns="0" tIns="0" rIns="0" bIns="0" rtlCol="0" anchor="t">
+            <a:spAutoFit/>
+          </a:bodyPr>
+          <a:lstStyle/>
+          <a:p>
+            <a:pPr marL="0" lvl="0" indent="0" algn="l">
+              <a:lnSpc>
+                <a:spcPts val="3749"/>
+              </a:lnSpc>
+              <a:spcBef>
+                <a:spcPct val="0"/>
+              </a:spcBef>
+            </a:pPr>
+            <a:r>
+              <a:rPr lang="en-US" sz="3300" dirty="0">
+                <a:solidFill>
+                  <a:srgbClr val="000000"/>
+                </a:solidFill>
+                <a:latin typeface="Open Sans 1"/>
+              </a:rPr>
+              <a:t>React</a:t>
+            </a:r>
+            <a:r>
+              <a:rPr lang="hr-HR" sz="3300" dirty="0" err="1">
+                <a:solidFill>
+                  <a:srgbClr val="000000"/>
+                </a:solidFill>
+                <a:latin typeface="Open Sans 1"/>
+              </a:rPr>
+              <a:t>Query</a:t>
+            </a:r>
+            <a:endParaRPr lang="en-US" sz="3300" dirty="0">
+              <a:solidFill>
+                <a:srgbClr val="000000"/>
+              </a:solidFill>
+              <a:latin typeface="Open Sans 1"/>
+            </a:endParaRPr>
+          </a:p>
+        </p:txBody>
+      </p:sp>
+      <p:sp>
+        <p:nvSpPr>
+          <p:cNvPr id="15" name="TextBox 13">
+            <a:extLst>
+              <a:ext uri="{FF2B5EF4-FFF2-40B4-BE49-F238E27FC236}">
+                <a16:creationId xmlns:a16="http://schemas.microsoft.com/office/drawing/2014/main" id="{E665645F-5CC4-D65B-EE32-7EF04C27C645}"/>
+              </a:ext>
+            </a:extLst>
+          </p:cNvPr>
+          <p:cNvSpPr txBox="1"/>
+          <p:nvPr/>
+        </p:nvSpPr>
+        <p:spPr>
+          <a:xfrm>
+            <a:off x="11244203" y="7901395"/>
+            <a:ext cx="2657633" cy="474489"/>
+          </a:xfrm>
+          <a:prstGeom prst="rect">
+            <a:avLst/>
+          </a:prstGeom>
+        </p:spPr>
+        <p:txBody>
+          <a:bodyPr lIns="0" tIns="0" rIns="0" bIns="0" rtlCol="0" anchor="t">
+            <a:spAutoFit/>
+          </a:bodyPr>
+          <a:lstStyle/>
+          <a:p>
+            <a:pPr marL="0" lvl="0" indent="0" algn="l">
+              <a:lnSpc>
+                <a:spcPts val="3749"/>
+              </a:lnSpc>
+              <a:spcBef>
+                <a:spcPct val="0"/>
+              </a:spcBef>
+            </a:pPr>
+            <a:r>
+              <a:rPr lang="hr-HR" sz="3300" dirty="0" err="1">
+                <a:solidFill>
+                  <a:srgbClr val="000000"/>
+                </a:solidFill>
+                <a:latin typeface="Open Sans 1"/>
+              </a:rPr>
+              <a:t>TailwindCSS</a:t>
+            </a:r>
+            <a:endParaRPr lang="en-US" sz="3300" dirty="0">
+              <a:solidFill>
+                <a:srgbClr val="000000"/>
+              </a:solidFill>
+              <a:latin typeface="Open Sans 1"/>
+            </a:endParaRPr>
           </a:p>
         </p:txBody>
       </p:sp>
@@ -4811,7 +5274,7 @@
         <p:spPr>
           <a:xfrm>
             <a:off x="10490807" y="3852341"/>
-            <a:ext cx="6411532" cy="2877657"/>
+            <a:ext cx="6411532" cy="2320443"/>
           </a:xfrm>
           <a:prstGeom prst="rect">
             <a:avLst/>
@@ -4831,14 +5294,20 @@
               <a:buChar char="•"/>
             </a:pPr>
             <a:r>
-              <a:rPr lang="en-US" sz="3272">
+              <a:rPr lang="en-US" sz="3272" dirty="0" err="1">
                 <a:solidFill>
                   <a:srgbClr val="FF914D"/>
                 </a:solidFill>
                 <a:latin typeface="Open Sans 2 Bold"/>
               </a:rPr>
-              <a:t>komunikacija - Whatsapp</a:t>
-            </a:r>
+              <a:t>Whatsapp</a:t>
+            </a:r>
+            <a:endParaRPr lang="en-US" sz="3272" dirty="0">
+              <a:solidFill>
+                <a:srgbClr val="FF914D"/>
+              </a:solidFill>
+              <a:latin typeface="Open Sans 2 Bold"/>
+            </a:endParaRPr>
           </a:p>
           <a:p>
             <a:pPr marL="706455" lvl="1" indent="-353228">
@@ -4849,13 +5318,13 @@
               <a:buChar char="•"/>
             </a:pPr>
             <a:r>
-              <a:rPr lang="en-US" sz="3272">
+              <a:rPr lang="en-US" sz="3272" dirty="0">
                 <a:solidFill>
                   <a:srgbClr val="FF914D"/>
                 </a:solidFill>
                 <a:latin typeface="Open Sans 2 Bold"/>
               </a:rPr>
-              <a:t>razvojna okolina - Visual Studio Code</a:t>
+              <a:t>Visual Studio Code</a:t>
             </a:r>
           </a:p>
           <a:p>
@@ -4867,13 +5336,13 @@
               <a:buChar char="•"/>
             </a:pPr>
             <a:r>
-              <a:rPr lang="en-US" sz="3272">
+              <a:rPr lang="en-US" sz="3272" dirty="0">
                 <a:solidFill>
                   <a:srgbClr val="FF914D"/>
                 </a:solidFill>
                 <a:latin typeface="Open Sans 2 Bold"/>
               </a:rPr>
-              <a:t>baza podataka - Postgres</a:t>
+              <a:t>Postgres</a:t>
             </a:r>
           </a:p>
           <a:p>
@@ -4885,13 +5354,13 @@
               <a:buChar char="•"/>
             </a:pPr>
             <a:r>
-              <a:rPr lang="en-US" sz="3272">
+              <a:rPr lang="en-US" sz="3272" dirty="0">
                 <a:solidFill>
                   <a:srgbClr val="FF914D"/>
                 </a:solidFill>
                 <a:latin typeface="Open Sans 2 Bold"/>
               </a:rPr>
-              <a:t>pokretanje - Docker</a:t>
+              <a:t>Docker</a:t>
             </a:r>
           </a:p>
         </p:txBody>
@@ -6487,13 +6956,13 @@
               </a:lnSpc>
             </a:pPr>
             <a:r>
-              <a:rPr lang="en-US" sz="4800">
+              <a:rPr lang="en-US" sz="4800" dirty="0">
                 <a:solidFill>
                   <a:srgbClr val="1C3879"/>
                 </a:solidFill>
                 <a:latin typeface="Alata"/>
               </a:rPr>
-              <a:t>03</a:t>
+              <a:t>3</a:t>
             </a:r>
           </a:p>
         </p:txBody>
@@ -6563,13 +7032,13 @@
               </a:lnSpc>
             </a:pPr>
             <a:r>
-              <a:rPr lang="en-US" sz="4800">
+              <a:rPr lang="en-US" sz="4800" dirty="0">
                 <a:solidFill>
                   <a:srgbClr val="1C3879"/>
                 </a:solidFill>
                 <a:latin typeface="Alata"/>
               </a:rPr>
-              <a:t>01</a:t>
+              <a:t>1</a:t>
             </a:r>
           </a:p>
         </p:txBody>
@@ -6639,13 +7108,13 @@
               </a:lnSpc>
             </a:pPr>
             <a:r>
-              <a:rPr lang="en-US" sz="4800">
+              <a:rPr lang="en-US" sz="4800" dirty="0">
                 <a:solidFill>
                   <a:srgbClr val="1C3879"/>
                 </a:solidFill>
                 <a:latin typeface="Alata"/>
               </a:rPr>
-              <a:t>02</a:t>
+              <a:t>2</a:t>
             </a:r>
           </a:p>
         </p:txBody>
@@ -6715,13 +7184,13 @@
               </a:lnSpc>
             </a:pPr>
             <a:r>
-              <a:rPr lang="en-US" sz="4800">
+              <a:rPr lang="en-US" sz="4800" dirty="0">
                 <a:solidFill>
                   <a:srgbClr val="1C3879"/>
                 </a:solidFill>
                 <a:latin typeface="Alata"/>
               </a:rPr>
-              <a:t>04</a:t>
+              <a:t>4</a:t>
             </a:r>
           </a:p>
         </p:txBody>
@@ -6791,13 +7260,13 @@
               </a:lnSpc>
             </a:pPr>
             <a:r>
-              <a:rPr lang="en-US" sz="4800">
+              <a:rPr lang="en-US" sz="4800" dirty="0">
                 <a:solidFill>
                   <a:srgbClr val="1C3879"/>
                 </a:solidFill>
                 <a:latin typeface="Alata"/>
               </a:rPr>
-              <a:t>05</a:t>
+              <a:t>5</a:t>
             </a:r>
           </a:p>
         </p:txBody>
@@ -7246,7 +7715,7 @@
             <a:bodyPr/>
             <a:lstStyle/>
             <a:p>
-              <a:endParaRPr lang="hr-HR"/>
+              <a:endParaRPr lang="hr-HR" sz="1500"/>
             </a:p>
           </p:txBody>
         </p:sp>
@@ -8447,7 +8916,7 @@
         <p:spPr>
           <a:xfrm>
             <a:off x="1072260" y="5309442"/>
-            <a:ext cx="6606338" cy="1228725"/>
+            <a:ext cx="6606338" cy="1141916"/>
           </a:xfrm>
           <a:prstGeom prst="rect">
             <a:avLst/>
@@ -8468,7 +8937,7 @@
               </a:spcBef>
             </a:pPr>
             <a:r>
-              <a:rPr lang="en-US" sz="8000" dirty="0" err="1">
+              <a:rPr lang="en-US" sz="7000" dirty="0" err="1">
                 <a:solidFill>
                   <a:schemeClr val="tx2"/>
                 </a:solidFill>
@@ -8477,7 +8946,7 @@
               <a:t>Opis</a:t>
             </a:r>
             <a:r>
-              <a:rPr lang="en-US" sz="8000" dirty="0">
+              <a:rPr lang="en-US" sz="7000" dirty="0">
                 <a:solidFill>
                   <a:schemeClr val="tx2"/>
                 </a:solidFill>
@@ -8486,7 +8955,7 @@
               <a:t> </a:t>
             </a:r>
             <a:r>
-              <a:rPr lang="en-US" sz="8000" dirty="0" err="1">
+              <a:rPr lang="en-US" sz="7000" dirty="0" err="1">
                 <a:solidFill>
                   <a:schemeClr val="tx2"/>
                 </a:solidFill>
@@ -8494,7 +8963,7 @@
               </a:rPr>
               <a:t>zadatka</a:t>
             </a:r>
-            <a:endParaRPr lang="en-US" sz="8000" dirty="0">
+            <a:endParaRPr lang="en-US" sz="7000" dirty="0">
               <a:solidFill>
                 <a:schemeClr val="tx2"/>
               </a:solidFill>
@@ -8512,7 +8981,7 @@
         <p:spPr>
           <a:xfrm>
             <a:off x="7767795" y="4153990"/>
-            <a:ext cx="8000343" cy="4922901"/>
+            <a:ext cx="8000343" cy="4159408"/>
           </a:xfrm>
           <a:prstGeom prst="rect">
             <a:avLst/>
@@ -8532,14 +9001,29 @@
               <a:buChar char="•"/>
             </a:pPr>
             <a:r>
-              <a:rPr lang="en-US" sz="4200">
+              <a:rPr lang="en-US" sz="4200" dirty="0">
                 <a:solidFill>
                   <a:srgbClr val="1C3879"/>
                 </a:solidFill>
                 <a:latin typeface="Open Sans 2"/>
               </a:rPr>
-              <a:t>web-aplikacija</a:t>
-            </a:r>
+              <a:t>web-</a:t>
+            </a:r>
+            <a:r>
+              <a:rPr lang="en-US" sz="4200" dirty="0" err="1">
+                <a:solidFill>
+                  <a:srgbClr val="1C3879"/>
+                </a:solidFill>
+                <a:latin typeface="Open Sans 2"/>
+              </a:rPr>
+              <a:t>aplikacija</a:t>
+            </a:r>
+            <a:endParaRPr lang="en-US" sz="4200" dirty="0">
+              <a:solidFill>
+                <a:srgbClr val="1C3879"/>
+              </a:solidFill>
+              <a:latin typeface="Open Sans 2"/>
+            </a:endParaRPr>
           </a:p>
           <a:p>
             <a:pPr marL="906780" lvl="1" indent="-453390">
@@ -8550,13 +9034,94 @@
               <a:buChar char="•"/>
             </a:pPr>
             <a:r>
-              <a:rPr lang="en-US" sz="4200">
+              <a:rPr lang="en-US" sz="4200" dirty="0" err="1">
                 <a:solidFill>
                   <a:srgbClr val="1C3879"/>
                 </a:solidFill>
                 <a:latin typeface="Open Sans 2"/>
               </a:rPr>
-              <a:t>upravljanje smještajem i prijevozom korisnika </a:t>
+              <a:t>upravljanje</a:t>
+            </a:r>
+            <a:r>
+              <a:rPr lang="en-US" sz="4200" dirty="0">
+                <a:solidFill>
+                  <a:srgbClr val="1C3879"/>
+                </a:solidFill>
+                <a:latin typeface="Open Sans 2"/>
+              </a:rPr>
+              <a:t> </a:t>
+            </a:r>
+            <a:r>
+              <a:rPr lang="en-US" sz="4200" dirty="0" err="1">
+                <a:solidFill>
+                  <a:srgbClr val="1C3879"/>
+                </a:solidFill>
+                <a:latin typeface="Open Sans 2"/>
+              </a:rPr>
+              <a:t>smještajem</a:t>
+            </a:r>
+            <a:r>
+              <a:rPr lang="en-US" sz="4200" dirty="0">
+                <a:solidFill>
+                  <a:srgbClr val="1C3879"/>
+                </a:solidFill>
+                <a:latin typeface="Open Sans 2"/>
+              </a:rPr>
+              <a:t> </a:t>
+            </a:r>
+            <a:r>
+              <a:rPr lang="en-US" sz="4200" dirty="0" err="1">
+                <a:solidFill>
+                  <a:srgbClr val="1C3879"/>
+                </a:solidFill>
+                <a:latin typeface="Open Sans 2"/>
+              </a:rPr>
+              <a:t>i</a:t>
+            </a:r>
+            <a:r>
+              <a:rPr lang="en-US" sz="4200" dirty="0">
+                <a:solidFill>
+                  <a:srgbClr val="1C3879"/>
+                </a:solidFill>
+                <a:latin typeface="Open Sans 2"/>
+              </a:rPr>
+              <a:t> </a:t>
+            </a:r>
+            <a:r>
+              <a:rPr lang="en-US" sz="4200" dirty="0" err="1">
+                <a:solidFill>
+                  <a:srgbClr val="1C3879"/>
+                </a:solidFill>
+                <a:latin typeface="Open Sans 2"/>
+              </a:rPr>
+              <a:t>prijevozom</a:t>
+            </a:r>
+            <a:r>
+              <a:rPr lang="en-US" sz="4200" dirty="0">
+                <a:solidFill>
+                  <a:srgbClr val="1C3879"/>
+                </a:solidFill>
+                <a:latin typeface="Open Sans 2"/>
+              </a:rPr>
+              <a:t> </a:t>
+            </a:r>
+            <a:r>
+              <a:rPr lang="en-US" sz="4200" dirty="0" err="1">
+                <a:solidFill>
+                  <a:srgbClr val="1C3879"/>
+                </a:solidFill>
+                <a:latin typeface="Open Sans 2"/>
+              </a:rPr>
+              <a:t>korisnika</a:t>
+            </a:r>
+            <a:r>
+              <a:rPr lang="en-US" sz="4200" dirty="0">
+                <a:solidFill>
+                  <a:srgbClr val="1C3879"/>
+                </a:solidFill>
+                <a:latin typeface="Open Sans 2"/>
+              </a:rPr>
+              <a:t> </a:t>
             </a:r>
           </a:p>
           <a:p>
@@ -8568,14 +9133,92 @@
               <a:buChar char="•"/>
             </a:pPr>
             <a:r>
-              <a:rPr lang="en-US" sz="4200">
+              <a:rPr lang="en-US" sz="4200" dirty="0" err="1">
                 <a:solidFill>
                   <a:srgbClr val="1C3879"/>
                 </a:solidFill>
                 <a:latin typeface="Open Sans 2"/>
               </a:rPr>
-              <a:t>učinkovita, brza i jednostavna koordinacija smještaja i prijevoza</a:t>
-            </a:r>
+              <a:t>jednostavna</a:t>
+            </a:r>
+            <a:r>
+              <a:rPr lang="en-US" sz="4200" dirty="0">
+                <a:solidFill>
+                  <a:srgbClr val="1C3879"/>
+                </a:solidFill>
+                <a:latin typeface="Open Sans 2"/>
+              </a:rPr>
+              <a:t> </a:t>
+            </a:r>
+            <a:r>
+              <a:rPr lang="en-US" sz="4200" dirty="0" err="1">
+                <a:solidFill>
+                  <a:srgbClr val="1C3879"/>
+                </a:solidFill>
+                <a:latin typeface="Open Sans 2"/>
+              </a:rPr>
+              <a:t>koordinacija</a:t>
+            </a:r>
+            <a:r>
+              <a:rPr lang="en-US" sz="4200" dirty="0">
+                <a:solidFill>
+                  <a:srgbClr val="1C3879"/>
+                </a:solidFill>
+                <a:latin typeface="Open Sans 2"/>
+              </a:rPr>
+              <a:t> </a:t>
+            </a:r>
+            <a:r>
+              <a:rPr lang="en-US" sz="4200" dirty="0" err="1">
+                <a:solidFill>
+                  <a:srgbClr val="1C3879"/>
+                </a:solidFill>
+                <a:latin typeface="Open Sans 2"/>
+              </a:rPr>
+              <a:t>smještaja</a:t>
+            </a:r>
+            <a:r>
+              <a:rPr lang="en-US" sz="4200" dirty="0">
+                <a:solidFill>
+                  <a:srgbClr val="1C3879"/>
+                </a:solidFill>
+                <a:latin typeface="Open Sans 2"/>
+              </a:rPr>
+              <a:t> </a:t>
+            </a:r>
+            <a:r>
+              <a:rPr lang="en-US" sz="4200" dirty="0" err="1">
+                <a:solidFill>
+                  <a:srgbClr val="1C3879"/>
+                </a:solidFill>
+                <a:latin typeface="Open Sans 2"/>
+              </a:rPr>
+              <a:t>i</a:t>
+            </a:r>
+            <a:r>
+              <a:rPr lang="en-US" sz="4200" dirty="0">
+                <a:solidFill>
+                  <a:srgbClr val="1C3879"/>
+                </a:solidFill>
+                <a:latin typeface="Open Sans 2"/>
+              </a:rPr>
+              <a:t> </a:t>
+            </a:r>
+            <a:r>
+              <a:rPr lang="en-US" sz="4200" dirty="0" err="1">
+                <a:solidFill>
+                  <a:srgbClr val="1C3879"/>
+                </a:solidFill>
+                <a:latin typeface="Open Sans 2"/>
+              </a:rPr>
+              <a:t>prijevoza</a:t>
+            </a:r>
+            <a:endParaRPr lang="en-US" sz="4200" dirty="0">
+              <a:solidFill>
+                <a:srgbClr val="1C3879"/>
+              </a:solidFill>
+              <a:latin typeface="Open Sans 2"/>
+            </a:endParaRPr>
           </a:p>
         </p:txBody>
       </p:sp>
@@ -9037,7 +9680,7 @@
         <p:spPr>
           <a:xfrm>
             <a:off x="1135214" y="5325366"/>
-            <a:ext cx="6606338" cy="1228725"/>
+            <a:ext cx="6606338" cy="1141916"/>
           </a:xfrm>
           <a:prstGeom prst="rect">
             <a:avLst/>
@@ -9058,7 +9701,7 @@
               </a:spcBef>
             </a:pPr>
             <a:r>
-              <a:rPr lang="en-US" sz="8000" dirty="0" err="1">
+              <a:rPr lang="en-US" sz="7000" dirty="0" err="1">
                 <a:solidFill>
                   <a:schemeClr val="tx2"/>
                 </a:solidFill>
@@ -9067,7 +9710,7 @@
               <a:t>Opis</a:t>
             </a:r>
             <a:r>
-              <a:rPr lang="en-US" sz="8000" dirty="0">
+              <a:rPr lang="en-US" sz="7000" dirty="0">
                 <a:solidFill>
                   <a:schemeClr val="tx2"/>
                 </a:solidFill>
@@ -9076,7 +9719,7 @@
               <a:t> </a:t>
             </a:r>
             <a:r>
-              <a:rPr lang="en-US" sz="8000" dirty="0" err="1">
+              <a:rPr lang="en-US" sz="7000" dirty="0" err="1">
                 <a:solidFill>
                   <a:schemeClr val="tx2"/>
                 </a:solidFill>
@@ -9084,7 +9727,7 @@
               </a:rPr>
               <a:t>zadatka</a:t>
             </a:r>
-            <a:endParaRPr lang="en-US" sz="8000" dirty="0">
+            <a:endParaRPr lang="en-US" sz="7000" dirty="0">
               <a:solidFill>
                 <a:schemeClr val="tx2"/>
               </a:solidFill>
@@ -9731,13 +10374,76 @@
               </a:spcBef>
             </a:pPr>
             <a:r>
-              <a:rPr lang="en-US" sz="3749">
+              <a:rPr lang="en-US" sz="4300" b="1" dirty="0" err="1">
                 <a:solidFill>
                   <a:srgbClr val="1C3879"/>
                 </a:solidFill>
                 <a:latin typeface="Open Sans 1 Light"/>
               </a:rPr>
-              <a:t>Dijagrami obrazaca upotrebe 1 i 2</a:t>
+              <a:t>Dijagrami</a:t>
+            </a:r>
+            <a:r>
+              <a:rPr lang="en-US" sz="4300" b="1" dirty="0">
+                <a:solidFill>
+                  <a:srgbClr val="1C3879"/>
+                </a:solidFill>
+                <a:latin typeface="Open Sans 1 Light"/>
+              </a:rPr>
+              <a:t> </a:t>
+            </a:r>
+            <a:r>
+              <a:rPr lang="en-US" sz="4300" b="1" dirty="0" err="1">
+                <a:solidFill>
+                  <a:srgbClr val="1C3879"/>
+                </a:solidFill>
+                <a:latin typeface="Open Sans 1 Light"/>
+              </a:rPr>
+              <a:t>obrazaca</a:t>
+            </a:r>
+            <a:r>
+              <a:rPr lang="en-US" sz="4300" b="1" dirty="0">
+                <a:solidFill>
+                  <a:srgbClr val="1C3879"/>
+                </a:solidFill>
+                <a:latin typeface="Open Sans 1 Light"/>
+              </a:rPr>
+              <a:t> </a:t>
+            </a:r>
+            <a:r>
+              <a:rPr lang="en-US" sz="4300" b="1" dirty="0" err="1">
+                <a:solidFill>
+                  <a:srgbClr val="1C3879"/>
+                </a:solidFill>
+                <a:latin typeface="Open Sans 1 Light"/>
+              </a:rPr>
+              <a:t>upotrebe</a:t>
+            </a:r>
+            <a:r>
+              <a:rPr lang="en-US" sz="4300" b="1" dirty="0">
+                <a:solidFill>
+                  <a:srgbClr val="1C3879"/>
+                </a:solidFill>
+                <a:latin typeface="Open Sans 1 Light"/>
+              </a:rPr>
+              <a:t> 1 </a:t>
+            </a:r>
+            <a:r>
+              <a:rPr lang="en-US" sz="4300" b="1" dirty="0" err="1">
+                <a:solidFill>
+                  <a:srgbClr val="1C3879"/>
+                </a:solidFill>
+                <a:latin typeface="Open Sans 1 Light"/>
+              </a:rPr>
+              <a:t>i</a:t>
+            </a:r>
+            <a:r>
+              <a:rPr lang="en-US" sz="4300" b="1" dirty="0">
+                <a:solidFill>
+                  <a:srgbClr val="1C3879"/>
+                </a:solidFill>
+                <a:latin typeface="Open Sans 1 Light"/>
+              </a:rPr>
+              <a:t> 2</a:t>
             </a:r>
           </a:p>
         </p:txBody>
@@ -9882,7 +10588,7 @@
         <p:spPr>
           <a:xfrm>
             <a:off x="4906659" y="389821"/>
-            <a:ext cx="8474682" cy="638879"/>
+            <a:ext cx="8474682" cy="642484"/>
           </a:xfrm>
           <a:prstGeom prst="rect">
             <a:avLst/>
@@ -9903,13 +10609,76 @@
               </a:spcBef>
             </a:pPr>
             <a:r>
-              <a:rPr lang="en-US" sz="3749">
+              <a:rPr lang="en-US" sz="4300" b="1" dirty="0" err="1">
                 <a:solidFill>
                   <a:srgbClr val="1C3879"/>
                 </a:solidFill>
                 <a:latin typeface="Open Sans 1 Light"/>
               </a:rPr>
-              <a:t>Dijagrami obrazaca upotrebe 3 i 4</a:t>
+              <a:t>Dijagrami</a:t>
+            </a:r>
+            <a:r>
+              <a:rPr lang="en-US" sz="4300" b="1" dirty="0">
+                <a:solidFill>
+                  <a:srgbClr val="1C3879"/>
+                </a:solidFill>
+                <a:latin typeface="Open Sans 1 Light"/>
+              </a:rPr>
+              <a:t> </a:t>
+            </a:r>
+            <a:r>
+              <a:rPr lang="en-US" sz="4300" b="1" dirty="0" err="1">
+                <a:solidFill>
+                  <a:srgbClr val="1C3879"/>
+                </a:solidFill>
+                <a:latin typeface="Open Sans 1 Light"/>
+              </a:rPr>
+              <a:t>obrazaca</a:t>
+            </a:r>
+            <a:r>
+              <a:rPr lang="en-US" sz="4300" b="1" dirty="0">
+                <a:solidFill>
+                  <a:srgbClr val="1C3879"/>
+                </a:solidFill>
+                <a:latin typeface="Open Sans 1 Light"/>
+              </a:rPr>
+              <a:t> </a:t>
+            </a:r>
+            <a:r>
+              <a:rPr lang="en-US" sz="4300" b="1" dirty="0" err="1">
+                <a:solidFill>
+                  <a:srgbClr val="1C3879"/>
+                </a:solidFill>
+                <a:latin typeface="Open Sans 1 Light"/>
+              </a:rPr>
+              <a:t>upotrebe</a:t>
+            </a:r>
+            <a:r>
+              <a:rPr lang="en-US" sz="4300" b="1" dirty="0">
+                <a:solidFill>
+                  <a:srgbClr val="1C3879"/>
+                </a:solidFill>
+                <a:latin typeface="Open Sans 1 Light"/>
+              </a:rPr>
+              <a:t> 3 </a:t>
+            </a:r>
+            <a:r>
+              <a:rPr lang="en-US" sz="4300" b="1" dirty="0" err="1">
+                <a:solidFill>
+                  <a:srgbClr val="1C3879"/>
+                </a:solidFill>
+                <a:latin typeface="Open Sans 1 Light"/>
+              </a:rPr>
+              <a:t>i</a:t>
+            </a:r>
+            <a:r>
+              <a:rPr lang="en-US" sz="4300" b="1" dirty="0">
+                <a:solidFill>
+                  <a:srgbClr val="1C3879"/>
+                </a:solidFill>
+                <a:latin typeface="Open Sans 1 Light"/>
+              </a:rPr>
+              <a:t> 4</a:t>
             </a:r>
           </a:p>
         </p:txBody>
@@ -10286,13 +11055,121 @@
               </a:lnSpc>
             </a:pPr>
             <a:r>
-              <a:rPr lang="en-US" sz="3000">
+              <a:rPr lang="en-US" sz="3000" b="1" dirty="0" err="1">
                 <a:solidFill>
                   <a:srgbClr val="1C3879"/>
                 </a:solidFill>
                 <a:latin typeface="Open Sans 2"/>
               </a:rPr>
-              <a:t>visoka razina pouzdanosti u evidenciji i koordinaciji </a:t>
+              <a:t>visoka</a:t>
+            </a:r>
+            <a:r>
+              <a:rPr lang="en-US" sz="3000" b="1" dirty="0">
+                <a:solidFill>
+                  <a:srgbClr val="1C3879"/>
+                </a:solidFill>
+                <a:latin typeface="Open Sans 2"/>
+              </a:rPr>
+              <a:t> </a:t>
+            </a:r>
+            <a:r>
+              <a:rPr lang="en-US" sz="3000" b="1" dirty="0" err="1">
+                <a:solidFill>
+                  <a:srgbClr val="1C3879"/>
+                </a:solidFill>
+                <a:latin typeface="Open Sans 2"/>
+              </a:rPr>
+              <a:t>razina</a:t>
+            </a:r>
+            <a:r>
+              <a:rPr lang="en-US" sz="3000" b="1" dirty="0">
+                <a:solidFill>
+                  <a:srgbClr val="1C3879"/>
+                </a:solidFill>
+                <a:latin typeface="Open Sans 2"/>
+              </a:rPr>
+              <a:t> </a:t>
+            </a:r>
+            <a:r>
+              <a:rPr lang="en-US" sz="3000" b="1" dirty="0" err="1">
+                <a:solidFill>
+                  <a:srgbClr val="1C3879"/>
+                </a:solidFill>
+                <a:latin typeface="Open Sans 2"/>
+              </a:rPr>
+              <a:t>pouzdanosti</a:t>
+            </a:r>
+            <a:r>
+              <a:rPr lang="en-US" sz="3000" b="1" dirty="0">
+                <a:solidFill>
+                  <a:srgbClr val="1C3879"/>
+                </a:solidFill>
+                <a:latin typeface="Open Sans 2"/>
+              </a:rPr>
+              <a:t> </a:t>
+            </a:r>
+            <a:r>
+              <a:rPr lang="en-US" sz="3000" dirty="0">
+                <a:solidFill>
+                  <a:srgbClr val="1C3879"/>
+                </a:solidFill>
+                <a:latin typeface="Open Sans 2"/>
+              </a:rPr>
+              <a:t>u </a:t>
+            </a:r>
+            <a:r>
+              <a:rPr lang="en-US" sz="3000" dirty="0" err="1">
+                <a:solidFill>
+                  <a:srgbClr val="1C3879"/>
+                </a:solidFill>
+                <a:latin typeface="Open Sans 2"/>
+              </a:rPr>
+              <a:t>evidenciji</a:t>
+            </a:r>
+            <a:r>
+              <a:rPr lang="en-US" sz="3000" dirty="0">
+                <a:solidFill>
+                  <a:srgbClr val="1C3879"/>
+                </a:solidFill>
+                <a:latin typeface="Open Sans 2"/>
+              </a:rPr>
+              <a:t> </a:t>
+            </a:r>
+            <a:r>
+              <a:rPr lang="en-US" sz="3000" dirty="0" err="1">
+                <a:solidFill>
+                  <a:srgbClr val="1C3879"/>
+                </a:solidFill>
+                <a:latin typeface="Open Sans 2"/>
+              </a:rPr>
+              <a:t>i</a:t>
+            </a:r>
+            <a:r>
+              <a:rPr lang="en-US" sz="3000" dirty="0">
+                <a:solidFill>
+                  <a:srgbClr val="1C3879"/>
+                </a:solidFill>
+                <a:latin typeface="Open Sans 2"/>
+              </a:rPr>
+              <a:t> </a:t>
+            </a:r>
+            <a:r>
+              <a:rPr lang="en-US" sz="3000" dirty="0" err="1">
+                <a:solidFill>
+                  <a:srgbClr val="1C3879"/>
+                </a:solidFill>
+                <a:latin typeface="Open Sans 2"/>
+              </a:rPr>
+              <a:t>koordinaciji</a:t>
+            </a:r>
+            <a:r>
+              <a:rPr lang="en-US" sz="3000" dirty="0">
+                <a:solidFill>
+                  <a:srgbClr val="1C3879"/>
+                </a:solidFill>
+                <a:latin typeface="Open Sans 2"/>
+              </a:rPr>
+              <a:t> </a:t>
             </a:r>
           </a:p>
         </p:txBody>
@@ -10324,14 +11201,92 @@
               </a:lnSpc>
             </a:pPr>
             <a:r>
-              <a:rPr lang="en-US" sz="3000">
+              <a:rPr lang="en-US" sz="3000" dirty="0" err="1">
                 <a:solidFill>
                   <a:srgbClr val="1C3879"/>
                 </a:solidFill>
                 <a:latin typeface="Open Sans 2"/>
               </a:rPr>
-              <a:t>sučelje intuitivno i prilagođeno korisnicima</a:t>
-            </a:r>
+              <a:t>sučelje</a:t>
+            </a:r>
+            <a:r>
+              <a:rPr lang="en-US" sz="3000" dirty="0">
+                <a:solidFill>
+                  <a:srgbClr val="1C3879"/>
+                </a:solidFill>
+                <a:latin typeface="Open Sans 2"/>
+              </a:rPr>
+              <a:t> </a:t>
+            </a:r>
+            <a:r>
+              <a:rPr lang="en-US" sz="3000" b="1" dirty="0" err="1">
+                <a:solidFill>
+                  <a:srgbClr val="1C3879"/>
+                </a:solidFill>
+                <a:latin typeface="Open Sans 2"/>
+              </a:rPr>
+              <a:t>intuitivno</a:t>
+            </a:r>
+            <a:r>
+              <a:rPr lang="en-US" sz="3000" b="1" dirty="0">
+                <a:solidFill>
+                  <a:srgbClr val="1C3879"/>
+                </a:solidFill>
+                <a:latin typeface="Open Sans 2"/>
+              </a:rPr>
+              <a:t> </a:t>
+            </a:r>
+            <a:r>
+              <a:rPr lang="en-US" sz="3000" b="1" dirty="0" err="1">
+                <a:solidFill>
+                  <a:srgbClr val="1C3879"/>
+                </a:solidFill>
+                <a:latin typeface="Open Sans 2"/>
+              </a:rPr>
+              <a:t>i</a:t>
+            </a:r>
+            <a:r>
+              <a:rPr lang="en-US" sz="3000" b="1" dirty="0">
+                <a:solidFill>
+                  <a:srgbClr val="1C3879"/>
+                </a:solidFill>
+                <a:latin typeface="Open Sans 2"/>
+              </a:rPr>
+              <a:t> </a:t>
+            </a:r>
+            <a:r>
+              <a:rPr lang="en-US" sz="3000" b="1" dirty="0" err="1">
+                <a:solidFill>
+                  <a:srgbClr val="1C3879"/>
+                </a:solidFill>
+                <a:latin typeface="Open Sans 2"/>
+              </a:rPr>
+              <a:t>prilagođeno</a:t>
+            </a:r>
+            <a:r>
+              <a:rPr lang="en-US" sz="3000" b="1" dirty="0">
+                <a:solidFill>
+                  <a:srgbClr val="1C3879"/>
+                </a:solidFill>
+                <a:latin typeface="Open Sans 2"/>
+              </a:rPr>
+              <a:t> </a:t>
+            </a:r>
+            <a:r>
+              <a:rPr lang="en-US" sz="3000" dirty="0" err="1">
+                <a:solidFill>
+                  <a:srgbClr val="1C3879"/>
+                </a:solidFill>
+                <a:latin typeface="Open Sans 2"/>
+              </a:rPr>
+              <a:t>korisnicima</a:t>
+            </a:r>
+            <a:endParaRPr lang="en-US" sz="3000" dirty="0">
+              <a:solidFill>
+                <a:srgbClr val="1C3879"/>
+              </a:solidFill>
+              <a:latin typeface="Open Sans 2"/>
+            </a:endParaRPr>
           </a:p>
         </p:txBody>
       </p:sp>
@@ -10362,14 +11317,110 @@
               </a:lnSpc>
             </a:pPr>
             <a:r>
-              <a:rPr lang="en-US" sz="3000">
+              <a:rPr lang="en-US" sz="3000" b="1" dirty="0" err="1">
                 <a:solidFill>
                   <a:srgbClr val="1C3879"/>
                 </a:solidFill>
                 <a:latin typeface="Open Sans 2"/>
               </a:rPr>
-              <a:t>brzo vrijeme odaziva aplikacije na zahtjeve</a:t>
-            </a:r>
+              <a:t>brzo</a:t>
+            </a:r>
+            <a:r>
+              <a:rPr lang="en-US" sz="3000" b="1" dirty="0">
+                <a:solidFill>
+                  <a:srgbClr val="1C3879"/>
+                </a:solidFill>
+                <a:latin typeface="Open Sans 2"/>
+              </a:rPr>
+              <a:t> </a:t>
+            </a:r>
+            <a:r>
+              <a:rPr lang="en-US" sz="3000" b="1" dirty="0" err="1">
+                <a:solidFill>
+                  <a:srgbClr val="1C3879"/>
+                </a:solidFill>
+                <a:latin typeface="Open Sans 2"/>
+              </a:rPr>
+              <a:t>vrijeme</a:t>
+            </a:r>
+            <a:r>
+              <a:rPr lang="en-US" sz="3000" b="1" dirty="0">
+                <a:solidFill>
+                  <a:srgbClr val="1C3879"/>
+                </a:solidFill>
+                <a:latin typeface="Open Sans 2"/>
+              </a:rPr>
+              <a:t> </a:t>
+            </a:r>
+            <a:r>
+              <a:rPr lang="en-US" sz="3000" b="1" dirty="0" err="1">
+                <a:solidFill>
+                  <a:srgbClr val="1C3879"/>
+                </a:solidFill>
+                <a:latin typeface="Open Sans 2"/>
+              </a:rPr>
+              <a:t>odaziva</a:t>
+            </a:r>
+            <a:r>
+              <a:rPr lang="en-US" sz="3000" b="1" dirty="0">
+                <a:solidFill>
+                  <a:srgbClr val="1C3879"/>
+                </a:solidFill>
+                <a:latin typeface="Open Sans 2"/>
+              </a:rPr>
+              <a:t> </a:t>
+            </a:r>
+            <a:r>
+              <a:rPr lang="en-US" sz="3000" dirty="0" err="1">
+                <a:solidFill>
+                  <a:srgbClr val="1C3879"/>
+                </a:solidFill>
+                <a:latin typeface="Open Sans 2"/>
+              </a:rPr>
+              <a:t>aplikacije</a:t>
+            </a:r>
+            <a:r>
+              <a:rPr lang="en-US" sz="3000" dirty="0">
+                <a:solidFill>
+                  <a:srgbClr val="1C3879"/>
+                </a:solidFill>
+                <a:latin typeface="Open Sans 2"/>
+              </a:rPr>
+              <a:t> </a:t>
+            </a:r>
+            <a:r>
+              <a:rPr lang="en-US" sz="3000" dirty="0" err="1">
+                <a:solidFill>
+                  <a:srgbClr val="1C3879"/>
+                </a:solidFill>
+                <a:latin typeface="Open Sans 2"/>
+              </a:rPr>
+              <a:t>na</a:t>
+            </a:r>
+            <a:r>
+              <a:rPr lang="en-US" sz="3000" dirty="0">
+                <a:solidFill>
+                  <a:srgbClr val="1C3879"/>
+                </a:solidFill>
+                <a:latin typeface="Open Sans 2"/>
+              </a:rPr>
+              <a:t> </a:t>
+            </a:r>
+            <a:r>
+              <a:rPr lang="en-US" sz="3000" dirty="0" err="1">
+                <a:solidFill>
+                  <a:srgbClr val="1C3879"/>
+                </a:solidFill>
+                <a:latin typeface="Open Sans 2"/>
+              </a:rPr>
+              <a:t>zahtjeve</a:t>
+            </a:r>
+            <a:endParaRPr lang="en-US" sz="3000" dirty="0">
+              <a:solidFill>
+                <a:srgbClr val="1C3879"/>
+              </a:solidFill>
+              <a:latin typeface="Open Sans 2"/>
+            </a:endParaRPr>
           </a:p>
         </p:txBody>
       </p:sp>
@@ -10400,14 +11451,56 @@
               </a:lnSpc>
             </a:pPr>
             <a:r>
-              <a:rPr lang="en-US" sz="3000">
+              <a:rPr lang="en-US" sz="3000" dirty="0" err="1">
                 <a:solidFill>
                   <a:srgbClr val="1C3879"/>
                 </a:solidFill>
                 <a:latin typeface="Open Sans 2"/>
               </a:rPr>
-              <a:t>neophodni sigurnosni protokoli</a:t>
-            </a:r>
+              <a:t>neophodni</a:t>
+            </a:r>
+            <a:r>
+              <a:rPr lang="en-US" sz="3000" dirty="0">
+                <a:solidFill>
+                  <a:srgbClr val="1C3879"/>
+                </a:solidFill>
+                <a:latin typeface="Open Sans 2"/>
+              </a:rPr>
+              <a:t> </a:t>
+            </a:r>
+            <a:r>
+              <a:rPr lang="en-US" sz="3000" b="1" dirty="0" err="1">
+                <a:solidFill>
+                  <a:srgbClr val="1C3879"/>
+                </a:solidFill>
+                <a:latin typeface="Open Sans 2"/>
+              </a:rPr>
+              <a:t>sigurnosni</a:t>
+            </a:r>
+            <a:r>
+              <a:rPr lang="en-US" sz="3000" b="1" dirty="0">
+                <a:solidFill>
+                  <a:srgbClr val="1C3879"/>
+                </a:solidFill>
+                <a:latin typeface="Open Sans 2"/>
+              </a:rPr>
+              <a:t> </a:t>
+            </a:r>
+            <a:r>
+              <a:rPr lang="en-US" sz="3000" b="1" dirty="0" err="1">
+                <a:solidFill>
+                  <a:srgbClr val="1C3879"/>
+                </a:solidFill>
+                <a:latin typeface="Open Sans 2"/>
+              </a:rPr>
+              <a:t>protokoli</a:t>
+            </a:r>
+            <a:endParaRPr lang="en-US" sz="3000" b="1" dirty="0">
+              <a:solidFill>
+                <a:srgbClr val="1C3879"/>
+              </a:solidFill>
+              <a:latin typeface="Open Sans 2"/>
+            </a:endParaRPr>
           </a:p>
         </p:txBody>
       </p:sp>
@@ -10438,13 +11531,148 @@
               </a:lnSpc>
             </a:pPr>
             <a:r>
-              <a:rPr lang="en-US" sz="3000">
+              <a:rPr lang="en-US" sz="3000" dirty="0" err="1">
                 <a:solidFill>
                   <a:srgbClr val="1C3879"/>
                 </a:solidFill>
                 <a:latin typeface="Open Sans 2"/>
               </a:rPr>
-              <a:t>aplikacija podržava velik broj korisnika i smještajnih kapaciteta </a:t>
+              <a:t>aplikacija</a:t>
+            </a:r>
+            <a:r>
+              <a:rPr lang="en-US" sz="3000" dirty="0">
+                <a:solidFill>
+                  <a:srgbClr val="1C3879"/>
+                </a:solidFill>
+                <a:latin typeface="Open Sans 2"/>
+              </a:rPr>
+              <a:t> </a:t>
+            </a:r>
+            <a:r>
+              <a:rPr lang="en-US" sz="3000" dirty="0" err="1">
+                <a:solidFill>
+                  <a:srgbClr val="1C3879"/>
+                </a:solidFill>
+                <a:latin typeface="Open Sans 2"/>
+              </a:rPr>
+              <a:t>podržava</a:t>
+            </a:r>
+            <a:r>
+              <a:rPr lang="en-US" sz="3000" dirty="0">
+                <a:solidFill>
+                  <a:srgbClr val="1C3879"/>
+                </a:solidFill>
+                <a:latin typeface="Open Sans 2"/>
+              </a:rPr>
+              <a:t> </a:t>
+            </a:r>
+            <a:r>
+              <a:rPr lang="en-US" sz="3000" b="1" dirty="0" err="1">
+                <a:solidFill>
+                  <a:srgbClr val="1C3879"/>
+                </a:solidFill>
+                <a:latin typeface="Open Sans 2"/>
+              </a:rPr>
+              <a:t>velik</a:t>
+            </a:r>
+            <a:r>
+              <a:rPr lang="en-US" sz="3000" b="1" dirty="0">
+                <a:solidFill>
+                  <a:srgbClr val="1C3879"/>
+                </a:solidFill>
+                <a:latin typeface="Open Sans 2"/>
+              </a:rPr>
+              <a:t> </a:t>
+            </a:r>
+            <a:r>
+              <a:rPr lang="en-US" sz="3000" b="1" dirty="0" err="1">
+                <a:solidFill>
+                  <a:srgbClr val="1C3879"/>
+                </a:solidFill>
+                <a:latin typeface="Open Sans 2"/>
+              </a:rPr>
+              <a:t>broj</a:t>
+            </a:r>
+            <a:r>
+              <a:rPr lang="en-US" sz="3000" b="1" dirty="0">
+                <a:solidFill>
+                  <a:srgbClr val="1C3879"/>
+                </a:solidFill>
+                <a:latin typeface="Open Sans 2"/>
+              </a:rPr>
+              <a:t> </a:t>
+            </a:r>
+            <a:r>
+              <a:rPr lang="en-US" sz="3000" b="1" dirty="0" err="1">
+                <a:solidFill>
+                  <a:srgbClr val="1C3879"/>
+                </a:solidFill>
+                <a:latin typeface="Open Sans 2"/>
+              </a:rPr>
+              <a:t>korisnika</a:t>
+            </a:r>
+            <a:r>
+              <a:rPr lang="en-US" sz="3000" b="1" dirty="0">
+                <a:solidFill>
+                  <a:srgbClr val="1C3879"/>
+                </a:solidFill>
+                <a:latin typeface="Open Sans 2"/>
+              </a:rPr>
+              <a:t> </a:t>
+            </a:r>
+            <a:r>
+              <a:rPr lang="en-US" sz="3000" b="1" dirty="0" err="1">
+                <a:solidFill>
+                  <a:srgbClr val="1C3879"/>
+                </a:solidFill>
+                <a:latin typeface="Open Sans 2"/>
+              </a:rPr>
+              <a:t>i</a:t>
+            </a:r>
+            <a:r>
+              <a:rPr lang="en-US" sz="3000" b="1" dirty="0">
+                <a:solidFill>
+                  <a:srgbClr val="1C3879"/>
+                </a:solidFill>
+                <a:latin typeface="Open Sans 2"/>
+              </a:rPr>
+              <a:t> </a:t>
+            </a:r>
+            <a:r>
+              <a:rPr lang="en-US" sz="3000" b="1" dirty="0" err="1">
+                <a:solidFill>
+                  <a:srgbClr val="1C3879"/>
+                </a:solidFill>
+                <a:latin typeface="Open Sans 2"/>
+              </a:rPr>
+              <a:t>smještajnih</a:t>
+            </a:r>
+            <a:r>
+              <a:rPr lang="en-US" sz="3000" b="1" dirty="0">
+                <a:solidFill>
+                  <a:srgbClr val="1C3879"/>
+                </a:solidFill>
+                <a:latin typeface="Open Sans 2"/>
+              </a:rPr>
+              <a:t> </a:t>
+            </a:r>
+            <a:r>
+              <a:rPr lang="en-US" sz="3000" b="1" dirty="0" err="1">
+                <a:solidFill>
+                  <a:srgbClr val="1C3879"/>
+                </a:solidFill>
+                <a:latin typeface="Open Sans 2"/>
+              </a:rPr>
+              <a:t>kapaciteta</a:t>
+            </a:r>
+            <a:r>
+              <a:rPr lang="en-US" sz="3000" b="1" dirty="0">
+                <a:solidFill>
+                  <a:srgbClr val="1C3879"/>
+                </a:solidFill>
+                <a:latin typeface="Open Sans 2"/>
+              </a:rPr>
+              <a:t> </a:t>
             </a:r>
           </a:p>
         </p:txBody>

</xml_diff>